<commit_message>
datanode journalnode resourcemanager add healthcheck
</commit_message>
<xml_diff>
--- a/apps/hadoop-cluster-ha/resourcemanager-2/结构.pptx
+++ b/apps/hadoop-cluster-ha/resourcemanager-2/结构.pptx
@@ -3411,70 +3411,1149 @@
           <a:chExt cx="0" cy="0"/>
         </a:xfrm>
       </p:grpSpPr>
-      <p:sp>
-        <p:nvSpPr>
-          <p:cNvPr id="4" name="圆角矩形 3"/>
+      <p:grpSp>
+        <p:nvGrpSpPr>
+          <p:cNvPr id="29" name="组合 28"/>
+          <p:cNvGrpSpPr/>
+          <p:nvPr/>
+        </p:nvGrpSpPr>
+        <p:grpSpPr>
+          <a:xfrm>
+            <a:off x="852903" y="1649225"/>
+            <a:ext cx="10362161" cy="6050603"/>
+            <a:chOff x="707915" y="690663"/>
+            <a:chExt cx="10362161" cy="6050603"/>
+          </a:xfrm>
+        </p:grpSpPr>
+        <p:sp>
+          <p:nvSpPr>
+            <p:cNvPr id="4" name="圆角矩形 3"/>
+            <p:cNvSpPr/>
+            <p:nvPr/>
+          </p:nvSpPr>
+          <p:spPr>
+            <a:xfrm>
+              <a:off x="707915" y="690663"/>
+              <a:ext cx="10362161" cy="6050603"/>
+            </a:xfrm>
+            <a:prstGeom prst="roundRect">
+              <a:avLst/>
+            </a:prstGeom>
+          </p:spPr>
+          <p:style>
+            <a:lnRef idx="2">
+              <a:schemeClr val="accent1">
+                <a:shade val="50000"/>
+              </a:schemeClr>
+            </a:lnRef>
+            <a:fillRef idx="1">
+              <a:schemeClr val="accent1"/>
+            </a:fillRef>
+            <a:effectRef idx="0">
+              <a:schemeClr val="accent1"/>
+            </a:effectRef>
+            <a:fontRef idx="minor">
+              <a:schemeClr val="lt1"/>
+            </a:fontRef>
+          </p:style>
+          <p:txBody>
+            <a:bodyPr rtlCol="0" anchor="t" anchorCtr="0"/>
+            <a:lstStyle/>
+            <a:p>
+              <a:pPr algn="ctr"/>
+              <a:r>
+                <a:rPr lang="en-US" altLang="zh-CN" dirty="0" err="1" smtClean="0"/>
+                <a:t>Hadoop</a:t>
+              </a:r>
+              <a:r>
+                <a:rPr lang="en-US" altLang="zh-CN" dirty="0" smtClean="0"/>
+                <a:t>          cluster</a:t>
+              </a:r>
+              <a:endParaRPr lang="zh-CN" altLang="en-US" dirty="0"/>
+            </a:p>
+          </p:txBody>
+        </p:sp>
+        <p:sp>
+          <p:nvSpPr>
+            <p:cNvPr id="5" name="圆角矩形 4"/>
+            <p:cNvSpPr/>
+            <p:nvPr/>
+          </p:nvSpPr>
+          <p:spPr>
+            <a:xfrm>
+              <a:off x="1120403" y="5223510"/>
+              <a:ext cx="1289655" cy="1154430"/>
+            </a:xfrm>
+            <a:prstGeom prst="roundRect">
+              <a:avLst/>
+            </a:prstGeom>
+            <a:solidFill>
+              <a:srgbClr val="92D050"/>
+            </a:solidFill>
+          </p:spPr>
+          <p:style>
+            <a:lnRef idx="2">
+              <a:schemeClr val="accent1">
+                <a:shade val="50000"/>
+              </a:schemeClr>
+            </a:lnRef>
+            <a:fillRef idx="1">
+              <a:schemeClr val="accent1"/>
+            </a:fillRef>
+            <a:effectRef idx="0">
+              <a:schemeClr val="accent1"/>
+            </a:effectRef>
+            <a:fontRef idx="minor">
+              <a:schemeClr val="lt1"/>
+            </a:fontRef>
+          </p:style>
+          <p:txBody>
+            <a:bodyPr rtlCol="0" anchor="ctr"/>
+            <a:lstStyle/>
+            <a:p>
+              <a:pPr algn="ctr"/>
+              <a:r>
+                <a:rPr lang="en-US" altLang="zh-CN" dirty="0" smtClean="0"/>
+                <a:t>DN/NM 0</a:t>
+              </a:r>
+              <a:endParaRPr lang="zh-CN" altLang="en-US" dirty="0" smtClean="0"/>
+            </a:p>
+          </p:txBody>
+        </p:sp>
+        <p:sp>
+          <p:nvSpPr>
+            <p:cNvPr id="6" name="圆角矩形 5"/>
+            <p:cNvSpPr/>
+            <p:nvPr/>
+          </p:nvSpPr>
+          <p:spPr>
+            <a:xfrm>
+              <a:off x="2526704" y="5223510"/>
+              <a:ext cx="1322070" cy="1154430"/>
+            </a:xfrm>
+            <a:prstGeom prst="roundRect">
+              <a:avLst/>
+            </a:prstGeom>
+            <a:solidFill>
+              <a:srgbClr val="92D050"/>
+            </a:solidFill>
+          </p:spPr>
+          <p:style>
+            <a:lnRef idx="2">
+              <a:schemeClr val="accent1">
+                <a:shade val="50000"/>
+              </a:schemeClr>
+            </a:lnRef>
+            <a:fillRef idx="1">
+              <a:schemeClr val="accent1"/>
+            </a:fillRef>
+            <a:effectRef idx="0">
+              <a:schemeClr val="accent1"/>
+            </a:effectRef>
+            <a:fontRef idx="minor">
+              <a:schemeClr val="lt1"/>
+            </a:fontRef>
+          </p:style>
+          <p:txBody>
+            <a:bodyPr rtlCol="0" anchor="ctr"/>
+            <a:lstStyle/>
+            <a:p>
+              <a:pPr algn="ctr"/>
+              <a:r>
+                <a:rPr lang="en-US" altLang="zh-CN" dirty="0" smtClean="0"/>
+                <a:t>DN/NM 1</a:t>
+              </a:r>
+              <a:endParaRPr lang="zh-CN" altLang="en-US" dirty="0" smtClean="0"/>
+            </a:p>
+          </p:txBody>
+        </p:sp>
+        <p:sp>
+          <p:nvSpPr>
+            <p:cNvPr id="7" name="圆角矩形 6"/>
+            <p:cNvSpPr/>
+            <p:nvPr/>
+          </p:nvSpPr>
+          <p:spPr>
+            <a:xfrm>
+              <a:off x="4068553" y="5223510"/>
+              <a:ext cx="1344930" cy="1154430"/>
+            </a:xfrm>
+            <a:prstGeom prst="roundRect">
+              <a:avLst/>
+            </a:prstGeom>
+            <a:solidFill>
+              <a:srgbClr val="92D050"/>
+            </a:solidFill>
+          </p:spPr>
+          <p:style>
+            <a:lnRef idx="2">
+              <a:schemeClr val="accent1">
+                <a:shade val="50000"/>
+              </a:schemeClr>
+            </a:lnRef>
+            <a:fillRef idx="1">
+              <a:schemeClr val="accent1"/>
+            </a:fillRef>
+            <a:effectRef idx="0">
+              <a:schemeClr val="accent1"/>
+            </a:effectRef>
+            <a:fontRef idx="minor">
+              <a:schemeClr val="lt1"/>
+            </a:fontRef>
+          </p:style>
+          <p:txBody>
+            <a:bodyPr rtlCol="0" anchor="ctr"/>
+            <a:lstStyle/>
+            <a:p>
+              <a:pPr algn="ctr"/>
+              <a:r>
+                <a:rPr lang="en-US" altLang="zh-CN" dirty="0" smtClean="0"/>
+                <a:t>DN/NM 2</a:t>
+              </a:r>
+              <a:endParaRPr lang="zh-CN" altLang="en-US" dirty="0" smtClean="0"/>
+            </a:p>
+          </p:txBody>
+        </p:sp>
+        <p:sp>
+          <p:nvSpPr>
+            <p:cNvPr id="8" name="圆角矩形 7"/>
+            <p:cNvSpPr/>
+            <p:nvPr/>
+          </p:nvSpPr>
+          <p:spPr>
+            <a:xfrm>
+              <a:off x="6174956" y="5223510"/>
+              <a:ext cx="1433410" cy="1154430"/>
+            </a:xfrm>
+            <a:prstGeom prst="roundRect">
+              <a:avLst/>
+            </a:prstGeom>
+            <a:solidFill>
+              <a:srgbClr val="00B050"/>
+            </a:solidFill>
+          </p:spPr>
+          <p:style>
+            <a:lnRef idx="2">
+              <a:schemeClr val="accent1">
+                <a:shade val="50000"/>
+              </a:schemeClr>
+            </a:lnRef>
+            <a:fillRef idx="1">
+              <a:schemeClr val="accent1"/>
+            </a:fillRef>
+            <a:effectRef idx="0">
+              <a:schemeClr val="accent1"/>
+            </a:effectRef>
+            <a:fontRef idx="minor">
+              <a:schemeClr val="lt1"/>
+            </a:fontRef>
+          </p:style>
+          <p:txBody>
+            <a:bodyPr rtlCol="0" anchor="ctr"/>
+            <a:lstStyle/>
+            <a:p>
+              <a:pPr algn="ctr"/>
+              <a:r>
+                <a:rPr lang="en-US" altLang="zh-CN" dirty="0" smtClean="0"/>
+                <a:t>DN/NM 3</a:t>
+              </a:r>
+              <a:endParaRPr lang="zh-CN" altLang="en-US" dirty="0"/>
+            </a:p>
+          </p:txBody>
+        </p:sp>
+        <p:sp>
+          <p:nvSpPr>
+            <p:cNvPr id="9" name="圆角矩形 8"/>
+            <p:cNvSpPr/>
+            <p:nvPr/>
+          </p:nvSpPr>
+          <p:spPr>
+            <a:xfrm>
+              <a:off x="7828145" y="5223510"/>
+              <a:ext cx="1432764" cy="1154430"/>
+            </a:xfrm>
+            <a:prstGeom prst="roundRect">
+              <a:avLst/>
+            </a:prstGeom>
+            <a:solidFill>
+              <a:srgbClr val="00B050"/>
+            </a:solidFill>
+          </p:spPr>
+          <p:style>
+            <a:lnRef idx="2">
+              <a:schemeClr val="accent1">
+                <a:shade val="50000"/>
+              </a:schemeClr>
+            </a:lnRef>
+            <a:fillRef idx="1">
+              <a:schemeClr val="accent1"/>
+            </a:fillRef>
+            <a:effectRef idx="0">
+              <a:schemeClr val="accent1"/>
+            </a:effectRef>
+            <a:fontRef idx="minor">
+              <a:schemeClr val="lt1"/>
+            </a:fontRef>
+          </p:style>
+          <p:txBody>
+            <a:bodyPr rtlCol="0" anchor="ctr"/>
+            <a:lstStyle/>
+            <a:p>
+              <a:pPr algn="ctr"/>
+              <a:r>
+                <a:rPr lang="en-US" altLang="zh-CN" dirty="0" smtClean="0"/>
+                <a:t>DN/NM</a:t>
+              </a:r>
+              <a:r>
+                <a:rPr lang="zh-CN" altLang="en-US" dirty="0" smtClean="0"/>
+                <a:t> </a:t>
+              </a:r>
+              <a:r>
+                <a:rPr lang="en-US" altLang="zh-CN" dirty="0" smtClean="0"/>
+                <a:t>4</a:t>
+              </a:r>
+              <a:endParaRPr lang="zh-CN" altLang="en-US" dirty="0" smtClean="0"/>
+            </a:p>
+          </p:txBody>
+        </p:sp>
+        <p:sp>
+          <p:nvSpPr>
+            <p:cNvPr id="10" name="圆角矩形 9"/>
+            <p:cNvSpPr/>
+            <p:nvPr/>
+          </p:nvSpPr>
+          <p:spPr>
+            <a:xfrm>
+              <a:off x="9480688" y="5223510"/>
+              <a:ext cx="1408626" cy="1154430"/>
+            </a:xfrm>
+            <a:prstGeom prst="roundRect">
+              <a:avLst/>
+            </a:prstGeom>
+            <a:solidFill>
+              <a:srgbClr val="00B050"/>
+            </a:solidFill>
+          </p:spPr>
+          <p:style>
+            <a:lnRef idx="2">
+              <a:schemeClr val="accent1">
+                <a:shade val="50000"/>
+              </a:schemeClr>
+            </a:lnRef>
+            <a:fillRef idx="1">
+              <a:schemeClr val="accent1"/>
+            </a:fillRef>
+            <a:effectRef idx="0">
+              <a:schemeClr val="accent1"/>
+            </a:effectRef>
+            <a:fontRef idx="minor">
+              <a:schemeClr val="lt1"/>
+            </a:fontRef>
+          </p:style>
+          <p:txBody>
+            <a:bodyPr rtlCol="0" anchor="ctr"/>
+            <a:lstStyle/>
+            <a:p>
+              <a:pPr algn="ctr"/>
+              <a:r>
+                <a:rPr lang="en-US" altLang="zh-CN" dirty="0" smtClean="0"/>
+                <a:t>DN/NM</a:t>
+              </a:r>
+              <a:r>
+                <a:rPr lang="zh-CN" altLang="en-US" dirty="0" smtClean="0"/>
+                <a:t> </a:t>
+              </a:r>
+              <a:r>
+                <a:rPr lang="en-US" altLang="zh-CN" smtClean="0"/>
+                <a:t>5</a:t>
+              </a:r>
+              <a:endParaRPr lang="zh-CN" altLang="en-US" dirty="0" smtClean="0"/>
+            </a:p>
+          </p:txBody>
+        </p:sp>
+        <p:cxnSp>
+          <p:nvCxnSpPr>
+            <p:cNvPr id="16" name="直接连接符 15"/>
+            <p:cNvCxnSpPr/>
+            <p:nvPr/>
+          </p:nvCxnSpPr>
+          <p:spPr>
+            <a:xfrm flipH="1">
+              <a:off x="1639501" y="4022874"/>
+              <a:ext cx="429329" cy="1109682"/>
+            </a:xfrm>
+            <a:prstGeom prst="line">
+              <a:avLst/>
+            </a:prstGeom>
+            <a:ln/>
+          </p:spPr>
+          <p:style>
+            <a:lnRef idx="3">
+              <a:schemeClr val="dk1"/>
+            </a:lnRef>
+            <a:fillRef idx="0">
+              <a:schemeClr val="dk1"/>
+            </a:fillRef>
+            <a:effectRef idx="2">
+              <a:schemeClr val="dk1"/>
+            </a:effectRef>
+            <a:fontRef idx="minor">
+              <a:schemeClr val="tx1"/>
+            </a:fontRef>
+          </p:style>
+        </p:cxnSp>
+        <p:cxnSp>
+          <p:nvCxnSpPr>
+            <p:cNvPr id="18" name="直接连接符 17"/>
+            <p:cNvCxnSpPr/>
+            <p:nvPr/>
+          </p:nvCxnSpPr>
+          <p:spPr>
+            <a:xfrm>
+              <a:off x="2478074" y="4022874"/>
+              <a:ext cx="625440" cy="1200636"/>
+            </a:xfrm>
+            <a:prstGeom prst="line">
+              <a:avLst/>
+            </a:prstGeom>
+            <a:ln/>
+          </p:spPr>
+          <p:style>
+            <a:lnRef idx="3">
+              <a:schemeClr val="dk1"/>
+            </a:lnRef>
+            <a:fillRef idx="0">
+              <a:schemeClr val="dk1"/>
+            </a:fillRef>
+            <a:effectRef idx="2">
+              <a:schemeClr val="dk1"/>
+            </a:effectRef>
+            <a:fontRef idx="minor">
+              <a:schemeClr val="tx1"/>
+            </a:fontRef>
+          </p:style>
+        </p:cxnSp>
+        <p:cxnSp>
+          <p:nvCxnSpPr>
+            <p:cNvPr id="20" name="直接连接符 19"/>
+            <p:cNvCxnSpPr/>
+            <p:nvPr/>
+          </p:nvCxnSpPr>
+          <p:spPr>
+            <a:xfrm>
+              <a:off x="3063240" y="4011930"/>
+              <a:ext cx="1677778" cy="1131570"/>
+            </a:xfrm>
+            <a:prstGeom prst="line">
+              <a:avLst/>
+            </a:prstGeom>
+            <a:ln/>
+          </p:spPr>
+          <p:style>
+            <a:lnRef idx="3">
+              <a:schemeClr val="dk1"/>
+            </a:lnRef>
+            <a:fillRef idx="0">
+              <a:schemeClr val="dk1"/>
+            </a:fillRef>
+            <a:effectRef idx="2">
+              <a:schemeClr val="dk1"/>
+            </a:effectRef>
+            <a:fontRef idx="minor">
+              <a:schemeClr val="tx1"/>
+            </a:fontRef>
+          </p:style>
+        </p:cxnSp>
+        <p:cxnSp>
+          <p:nvCxnSpPr>
+            <p:cNvPr id="22" name="直接连接符 21"/>
+            <p:cNvCxnSpPr/>
+            <p:nvPr/>
+          </p:nvCxnSpPr>
+          <p:spPr>
+            <a:xfrm flipH="1">
+              <a:off x="7089439" y="3958306"/>
+              <a:ext cx="1455088" cy="1185194"/>
+            </a:xfrm>
+            <a:prstGeom prst="line">
+              <a:avLst/>
+            </a:prstGeom>
+            <a:ln/>
+          </p:spPr>
+          <p:style>
+            <a:lnRef idx="3">
+              <a:schemeClr val="dk1"/>
+            </a:lnRef>
+            <a:fillRef idx="0">
+              <a:schemeClr val="dk1"/>
+            </a:fillRef>
+            <a:effectRef idx="2">
+              <a:schemeClr val="dk1"/>
+            </a:effectRef>
+            <a:fontRef idx="minor">
+              <a:schemeClr val="tx1"/>
+            </a:fontRef>
+          </p:style>
+        </p:cxnSp>
+        <p:cxnSp>
+          <p:nvCxnSpPr>
+            <p:cNvPr id="23" name="直接连接符 22"/>
+            <p:cNvCxnSpPr/>
+            <p:nvPr/>
+          </p:nvCxnSpPr>
+          <p:spPr>
+            <a:xfrm flipH="1">
+              <a:off x="8544527" y="3958306"/>
+              <a:ext cx="434076" cy="1174250"/>
+            </a:xfrm>
+            <a:prstGeom prst="line">
+              <a:avLst/>
+            </a:prstGeom>
+            <a:ln/>
+          </p:spPr>
+          <p:style>
+            <a:lnRef idx="3">
+              <a:schemeClr val="dk1"/>
+            </a:lnRef>
+            <a:fillRef idx="0">
+              <a:schemeClr val="dk1"/>
+            </a:fillRef>
+            <a:effectRef idx="2">
+              <a:schemeClr val="dk1"/>
+            </a:effectRef>
+            <a:fontRef idx="minor">
+              <a:schemeClr val="tx1"/>
+            </a:fontRef>
+          </p:style>
+        </p:cxnSp>
+        <p:cxnSp>
+          <p:nvCxnSpPr>
+            <p:cNvPr id="24" name="直接连接符 23"/>
+            <p:cNvCxnSpPr/>
+            <p:nvPr/>
+          </p:nvCxnSpPr>
+          <p:spPr>
+            <a:xfrm>
+              <a:off x="9392022" y="3984692"/>
+              <a:ext cx="792979" cy="1147864"/>
+            </a:xfrm>
+            <a:prstGeom prst="line">
+              <a:avLst/>
+            </a:prstGeom>
+            <a:ln/>
+          </p:spPr>
+          <p:style>
+            <a:lnRef idx="3">
+              <a:schemeClr val="dk1"/>
+            </a:lnRef>
+            <a:fillRef idx="0">
+              <a:schemeClr val="dk1"/>
+            </a:fillRef>
+            <a:effectRef idx="2">
+              <a:schemeClr val="dk1"/>
+            </a:effectRef>
+            <a:fontRef idx="minor">
+              <a:schemeClr val="tx1"/>
+            </a:fontRef>
+          </p:style>
+        </p:cxnSp>
+        <p:sp>
+          <p:nvSpPr>
+            <p:cNvPr id="28" name="圆角矩形 27"/>
+            <p:cNvSpPr/>
+            <p:nvPr/>
+          </p:nvSpPr>
+          <p:spPr>
+            <a:xfrm>
+              <a:off x="5029118" y="2182279"/>
+              <a:ext cx="1440701" cy="541466"/>
+            </a:xfrm>
+            <a:prstGeom prst="roundRect">
+              <a:avLst/>
+            </a:prstGeom>
+            <a:solidFill>
+              <a:srgbClr val="FFC000"/>
+            </a:solidFill>
+          </p:spPr>
+          <p:style>
+            <a:lnRef idx="2">
+              <a:schemeClr val="accent1">
+                <a:shade val="50000"/>
+              </a:schemeClr>
+            </a:lnRef>
+            <a:fillRef idx="1">
+              <a:schemeClr val="accent1"/>
+            </a:fillRef>
+            <a:effectRef idx="0">
+              <a:schemeClr val="accent1"/>
+            </a:effectRef>
+            <a:fontRef idx="minor">
+              <a:schemeClr val="lt1"/>
+            </a:fontRef>
+          </p:style>
+          <p:txBody>
+            <a:bodyPr rtlCol="0" anchor="ctr"/>
+            <a:lstStyle/>
+            <a:p>
+              <a:pPr algn="ctr"/>
+              <a:r>
+                <a:rPr lang="en-US" altLang="zh-CN" dirty="0" smtClean="0"/>
+                <a:t>NN 0</a:t>
+              </a:r>
+              <a:endParaRPr lang="zh-CN" altLang="en-US" dirty="0"/>
+            </a:p>
+          </p:txBody>
+        </p:sp>
+        <p:sp>
+          <p:nvSpPr>
+            <p:cNvPr id="58" name="圆角矩形 57"/>
+            <p:cNvSpPr/>
+            <p:nvPr/>
+          </p:nvSpPr>
+          <p:spPr>
+            <a:xfrm>
+              <a:off x="1048268" y="1527486"/>
+              <a:ext cx="2346880" cy="2469123"/>
+            </a:xfrm>
+            <a:prstGeom prst="roundRect">
+              <a:avLst/>
+            </a:prstGeom>
+            <a:solidFill>
+              <a:schemeClr val="bg1">
+                <a:lumMod val="75000"/>
+              </a:schemeClr>
+            </a:solidFill>
+          </p:spPr>
+          <p:style>
+            <a:lnRef idx="2">
+              <a:schemeClr val="accent1">
+                <a:shade val="50000"/>
+              </a:schemeClr>
+            </a:lnRef>
+            <a:fillRef idx="1">
+              <a:schemeClr val="accent1"/>
+            </a:fillRef>
+            <a:effectRef idx="0">
+              <a:schemeClr val="accent1"/>
+            </a:effectRef>
+            <a:fontRef idx="minor">
+              <a:schemeClr val="lt1"/>
+            </a:fontRef>
+          </p:style>
+          <p:txBody>
+            <a:bodyPr rtlCol="0" anchor="t" anchorCtr="0"/>
+            <a:lstStyle/>
+            <a:p>
+              <a:pPr algn="ctr"/>
+              <a:r>
+                <a:rPr lang="en-US" altLang="zh-CN" dirty="0" err="1" smtClean="0"/>
+                <a:t>resourcemanager</a:t>
+              </a:r>
+              <a:r>
+                <a:rPr lang="en-US" altLang="zh-CN" dirty="0" smtClean="0"/>
+                <a:t> 0</a:t>
+              </a:r>
+              <a:endParaRPr lang="zh-CN" altLang="en-US" dirty="0"/>
+            </a:p>
+          </p:txBody>
+        </p:sp>
+        <p:sp>
+          <p:nvSpPr>
+            <p:cNvPr id="32" name="圆角矩形 31"/>
+            <p:cNvSpPr/>
+            <p:nvPr/>
+          </p:nvSpPr>
+          <p:spPr>
+            <a:xfrm>
+              <a:off x="5029120" y="1527486"/>
+              <a:ext cx="1440700" cy="607739"/>
+            </a:xfrm>
+            <a:prstGeom prst="roundRect">
+              <a:avLst/>
+            </a:prstGeom>
+            <a:solidFill>
+              <a:srgbClr val="FFC000"/>
+            </a:solidFill>
+          </p:spPr>
+          <p:style>
+            <a:lnRef idx="2">
+              <a:schemeClr val="accent1">
+                <a:shade val="50000"/>
+              </a:schemeClr>
+            </a:lnRef>
+            <a:fillRef idx="1">
+              <a:schemeClr val="accent1"/>
+            </a:fillRef>
+            <a:effectRef idx="0">
+              <a:schemeClr val="accent1"/>
+            </a:effectRef>
+            <a:fontRef idx="minor">
+              <a:schemeClr val="lt1"/>
+            </a:fontRef>
+          </p:style>
+          <p:txBody>
+            <a:bodyPr rtlCol="0" anchor="ctr"/>
+            <a:lstStyle/>
+            <a:p>
+              <a:pPr algn="ctr"/>
+              <a:r>
+                <a:rPr lang="en-US" altLang="zh-CN" dirty="0" smtClean="0"/>
+                <a:t>NN 1</a:t>
+              </a:r>
+              <a:endParaRPr lang="zh-CN" altLang="en-US" dirty="0"/>
+            </a:p>
+          </p:txBody>
+        </p:sp>
+        <p:cxnSp>
+          <p:nvCxnSpPr>
+            <p:cNvPr id="38" name="直接连接符 37"/>
+            <p:cNvCxnSpPr/>
+            <p:nvPr/>
+          </p:nvCxnSpPr>
+          <p:spPr>
+            <a:xfrm flipV="1">
+              <a:off x="2068830" y="2597285"/>
+              <a:ext cx="2960288" cy="2543295"/>
+            </a:xfrm>
+            <a:prstGeom prst="line">
+              <a:avLst/>
+            </a:prstGeom>
+          </p:spPr>
+          <p:style>
+            <a:lnRef idx="3">
+              <a:schemeClr val="accent4"/>
+            </a:lnRef>
+            <a:fillRef idx="0">
+              <a:schemeClr val="accent4"/>
+            </a:fillRef>
+            <a:effectRef idx="2">
+              <a:schemeClr val="accent4"/>
+            </a:effectRef>
+            <a:fontRef idx="minor">
+              <a:schemeClr val="tx1"/>
+            </a:fontRef>
+          </p:style>
+        </p:cxnSp>
+        <p:cxnSp>
+          <p:nvCxnSpPr>
+            <p:cNvPr id="39" name="直接连接符 38"/>
+            <p:cNvCxnSpPr/>
+            <p:nvPr/>
+          </p:nvCxnSpPr>
+          <p:spPr>
+            <a:xfrm flipV="1">
+              <a:off x="3250388" y="2723745"/>
+              <a:ext cx="1769538" cy="2488823"/>
+            </a:xfrm>
+            <a:prstGeom prst="line">
+              <a:avLst/>
+            </a:prstGeom>
+          </p:spPr>
+          <p:style>
+            <a:lnRef idx="3">
+              <a:schemeClr val="accent4"/>
+            </a:lnRef>
+            <a:fillRef idx="0">
+              <a:schemeClr val="accent4"/>
+            </a:fillRef>
+            <a:effectRef idx="2">
+              <a:schemeClr val="accent4"/>
+            </a:effectRef>
+            <a:fontRef idx="minor">
+              <a:schemeClr val="tx1"/>
+            </a:fontRef>
+          </p:style>
+        </p:cxnSp>
+        <p:cxnSp>
+          <p:nvCxnSpPr>
+            <p:cNvPr id="41" name="直接连接符 40"/>
+            <p:cNvCxnSpPr/>
+            <p:nvPr/>
+          </p:nvCxnSpPr>
+          <p:spPr>
+            <a:xfrm flipV="1">
+              <a:off x="4796463" y="2723745"/>
+              <a:ext cx="416024" cy="2408813"/>
+            </a:xfrm>
+            <a:prstGeom prst="line">
+              <a:avLst/>
+            </a:prstGeom>
+          </p:spPr>
+          <p:style>
+            <a:lnRef idx="3">
+              <a:schemeClr val="accent4"/>
+            </a:lnRef>
+            <a:fillRef idx="0">
+              <a:schemeClr val="accent4"/>
+            </a:fillRef>
+            <a:effectRef idx="2">
+              <a:schemeClr val="accent4"/>
+            </a:effectRef>
+            <a:fontRef idx="minor">
+              <a:schemeClr val="tx1"/>
+            </a:fontRef>
+          </p:style>
+        </p:cxnSp>
+        <p:cxnSp>
+          <p:nvCxnSpPr>
+            <p:cNvPr id="43" name="直接连接符 42"/>
+            <p:cNvCxnSpPr/>
+            <p:nvPr/>
+          </p:nvCxnSpPr>
+          <p:spPr>
+            <a:xfrm flipH="1" flipV="1">
+              <a:off x="6210676" y="2754630"/>
+              <a:ext cx="791250" cy="2377929"/>
+            </a:xfrm>
+            <a:prstGeom prst="line">
+              <a:avLst/>
+            </a:prstGeom>
+          </p:spPr>
+          <p:style>
+            <a:lnRef idx="3">
+              <a:schemeClr val="accent4"/>
+            </a:lnRef>
+            <a:fillRef idx="0">
+              <a:schemeClr val="accent4"/>
+            </a:fillRef>
+            <a:effectRef idx="2">
+              <a:schemeClr val="accent4"/>
+            </a:effectRef>
+            <a:fontRef idx="minor">
+              <a:schemeClr val="tx1"/>
+            </a:fontRef>
+          </p:style>
+        </p:cxnSp>
+        <p:cxnSp>
+          <p:nvCxnSpPr>
+            <p:cNvPr id="46" name="直接连接符 45"/>
+            <p:cNvCxnSpPr/>
+            <p:nvPr/>
+          </p:nvCxnSpPr>
+          <p:spPr>
+            <a:xfrm flipH="1" flipV="1">
+              <a:off x="6430433" y="2754630"/>
+              <a:ext cx="2026584" cy="2377928"/>
+            </a:xfrm>
+            <a:prstGeom prst="line">
+              <a:avLst/>
+            </a:prstGeom>
+          </p:spPr>
+          <p:style>
+            <a:lnRef idx="3">
+              <a:schemeClr val="accent4"/>
+            </a:lnRef>
+            <a:fillRef idx="0">
+              <a:schemeClr val="accent4"/>
+            </a:fillRef>
+            <a:effectRef idx="2">
+              <a:schemeClr val="accent4"/>
+            </a:effectRef>
+            <a:fontRef idx="minor">
+              <a:schemeClr val="tx1"/>
+            </a:fontRef>
+          </p:style>
+        </p:cxnSp>
+        <p:cxnSp>
+          <p:nvCxnSpPr>
+            <p:cNvPr id="49" name="直接连接符 48"/>
+            <p:cNvCxnSpPr/>
+            <p:nvPr/>
+          </p:nvCxnSpPr>
+          <p:spPr>
+            <a:xfrm flipH="1" flipV="1">
+              <a:off x="6503699" y="2500009"/>
+              <a:ext cx="3676199" cy="2692616"/>
+            </a:xfrm>
+            <a:prstGeom prst="line">
+              <a:avLst/>
+            </a:prstGeom>
+          </p:spPr>
+          <p:style>
+            <a:lnRef idx="3">
+              <a:schemeClr val="accent4"/>
+            </a:lnRef>
+            <a:fillRef idx="0">
+              <a:schemeClr val="accent4"/>
+            </a:fillRef>
+            <a:effectRef idx="2">
+              <a:schemeClr val="accent4"/>
+            </a:effectRef>
+            <a:fontRef idx="minor">
+              <a:schemeClr val="tx1"/>
+            </a:fontRef>
+          </p:style>
+        </p:cxnSp>
+        <p:sp>
+          <p:nvSpPr>
+            <p:cNvPr id="12" name="圆角矩形 11"/>
+            <p:cNvSpPr/>
+            <p:nvPr/>
+          </p:nvSpPr>
+          <p:spPr>
+            <a:xfrm>
+              <a:off x="1377835" y="2337436"/>
+              <a:ext cx="1680210" cy="742950"/>
+            </a:xfrm>
+            <a:prstGeom prst="roundRect">
+              <a:avLst/>
+            </a:prstGeom>
+            <a:solidFill>
+              <a:schemeClr val="accent2">
+                <a:lumMod val="60000"/>
+                <a:lumOff val="40000"/>
+              </a:schemeClr>
+            </a:solidFill>
+          </p:spPr>
+          <p:style>
+            <a:lnRef idx="2">
+              <a:schemeClr val="accent1">
+                <a:shade val="50000"/>
+              </a:schemeClr>
+            </a:lnRef>
+            <a:fillRef idx="1">
+              <a:schemeClr val="accent1"/>
+            </a:fillRef>
+            <a:effectRef idx="0">
+              <a:schemeClr val="accent1"/>
+            </a:effectRef>
+            <a:fontRef idx="minor">
+              <a:schemeClr val="lt1"/>
+            </a:fontRef>
+          </p:style>
+          <p:txBody>
+            <a:bodyPr rtlCol="0" anchor="ctr"/>
+            <a:lstStyle/>
+            <a:p>
+              <a:pPr algn="ctr"/>
+              <a:r>
+                <a:rPr lang="en-US" altLang="zh-CN" dirty="0" smtClean="0"/>
+                <a:t>RM 1</a:t>
+              </a:r>
+              <a:endParaRPr lang="zh-CN" altLang="en-US" dirty="0" smtClean="0"/>
+            </a:p>
+          </p:txBody>
+        </p:sp>
+        <p:sp>
+          <p:nvSpPr>
+            <p:cNvPr id="11" name="圆角矩形 10"/>
+            <p:cNvSpPr/>
+            <p:nvPr/>
+          </p:nvSpPr>
+          <p:spPr>
+            <a:xfrm>
+              <a:off x="1377835" y="3122214"/>
+              <a:ext cx="1680210" cy="742950"/>
+            </a:xfrm>
+            <a:prstGeom prst="roundRect">
+              <a:avLst/>
+            </a:prstGeom>
+            <a:solidFill>
+              <a:schemeClr val="accent2">
+                <a:lumMod val="60000"/>
+                <a:lumOff val="40000"/>
+              </a:schemeClr>
+            </a:solidFill>
+          </p:spPr>
+          <p:style>
+            <a:lnRef idx="2">
+              <a:schemeClr val="accent1">
+                <a:shade val="50000"/>
+              </a:schemeClr>
+            </a:lnRef>
+            <a:fillRef idx="1">
+              <a:schemeClr val="accent1"/>
+            </a:fillRef>
+            <a:effectRef idx="0">
+              <a:schemeClr val="accent1"/>
+            </a:effectRef>
+            <a:fontRef idx="minor">
+              <a:schemeClr val="lt1"/>
+            </a:fontRef>
+          </p:style>
+          <p:txBody>
+            <a:bodyPr rtlCol="0" anchor="ctr"/>
+            <a:lstStyle/>
+            <a:p>
+              <a:pPr algn="ctr"/>
+              <a:r>
+                <a:rPr lang="en-US" altLang="zh-CN" dirty="0" smtClean="0"/>
+                <a:t>RM 0</a:t>
+              </a:r>
+              <a:endParaRPr lang="zh-CN" altLang="en-US" dirty="0"/>
+            </a:p>
+          </p:txBody>
+        </p:sp>
+        <p:sp>
+          <p:nvSpPr>
+            <p:cNvPr id="59" name="圆角矩形 58"/>
+            <p:cNvSpPr/>
+            <p:nvPr/>
+          </p:nvSpPr>
+          <p:spPr>
+            <a:xfrm>
+              <a:off x="8193114" y="1473740"/>
+              <a:ext cx="2346880" cy="2469123"/>
+            </a:xfrm>
+            <a:prstGeom prst="roundRect">
+              <a:avLst/>
+            </a:prstGeom>
+            <a:solidFill>
+              <a:schemeClr val="bg1">
+                <a:lumMod val="75000"/>
+              </a:schemeClr>
+            </a:solidFill>
+          </p:spPr>
+          <p:style>
+            <a:lnRef idx="2">
+              <a:schemeClr val="accent1">
+                <a:shade val="50000"/>
+              </a:schemeClr>
+            </a:lnRef>
+            <a:fillRef idx="1">
+              <a:schemeClr val="accent1"/>
+            </a:fillRef>
+            <a:effectRef idx="0">
+              <a:schemeClr val="accent1"/>
+            </a:effectRef>
+            <a:fontRef idx="minor">
+              <a:schemeClr val="lt1"/>
+            </a:fontRef>
+          </p:style>
+          <p:txBody>
+            <a:bodyPr rtlCol="0" anchor="t" anchorCtr="0"/>
+            <a:lstStyle/>
+            <a:p>
+              <a:pPr algn="ctr"/>
+              <a:r>
+                <a:rPr lang="en-US" altLang="zh-CN" dirty="0" err="1" smtClean="0"/>
+                <a:t>resourcemanager</a:t>
+              </a:r>
+              <a:r>
+                <a:rPr lang="en-US" altLang="zh-CN" dirty="0" smtClean="0"/>
+                <a:t> 1</a:t>
+              </a:r>
+              <a:endParaRPr lang="zh-CN" altLang="en-US" dirty="0"/>
+            </a:p>
+          </p:txBody>
+        </p:sp>
+        <p:sp>
+          <p:nvSpPr>
+            <p:cNvPr id="14" name="圆角矩形 13"/>
+            <p:cNvSpPr/>
+            <p:nvPr/>
+          </p:nvSpPr>
+          <p:spPr>
+            <a:xfrm>
+              <a:off x="8508370" y="2352270"/>
+              <a:ext cx="1680210" cy="742950"/>
+            </a:xfrm>
+            <a:prstGeom prst="roundRect">
+              <a:avLst/>
+            </a:prstGeom>
+            <a:solidFill>
+              <a:schemeClr val="accent2">
+                <a:lumMod val="60000"/>
+                <a:lumOff val="40000"/>
+              </a:schemeClr>
+            </a:solidFill>
+          </p:spPr>
+          <p:style>
+            <a:lnRef idx="2">
+              <a:schemeClr val="accent1">
+                <a:shade val="50000"/>
+              </a:schemeClr>
+            </a:lnRef>
+            <a:fillRef idx="1">
+              <a:schemeClr val="accent1"/>
+            </a:fillRef>
+            <a:effectRef idx="0">
+              <a:schemeClr val="accent1"/>
+            </a:effectRef>
+            <a:fontRef idx="minor">
+              <a:schemeClr val="lt1"/>
+            </a:fontRef>
+          </p:style>
+          <p:txBody>
+            <a:bodyPr rtlCol="0" anchor="ctr"/>
+            <a:lstStyle/>
+            <a:p>
+              <a:pPr algn="ctr"/>
+              <a:r>
+                <a:rPr lang="en-US" altLang="zh-CN" dirty="0" smtClean="0"/>
+                <a:t>RM 1</a:t>
+              </a:r>
+              <a:endParaRPr lang="zh-CN" altLang="en-US" dirty="0" smtClean="0"/>
+            </a:p>
+          </p:txBody>
+        </p:sp>
+        <p:sp>
+          <p:nvSpPr>
+            <p:cNvPr id="13" name="圆角矩形 12"/>
+            <p:cNvSpPr/>
+            <p:nvPr/>
+          </p:nvSpPr>
+          <p:spPr>
+            <a:xfrm>
+              <a:off x="8483803" y="3146716"/>
+              <a:ext cx="1680210" cy="742950"/>
+            </a:xfrm>
+            <a:prstGeom prst="roundRect">
+              <a:avLst/>
+            </a:prstGeom>
+            <a:solidFill>
+              <a:schemeClr val="accent2">
+                <a:lumMod val="60000"/>
+                <a:lumOff val="40000"/>
+              </a:schemeClr>
+            </a:solidFill>
+          </p:spPr>
+          <p:style>
+            <a:lnRef idx="2">
+              <a:schemeClr val="accent1">
+                <a:shade val="50000"/>
+              </a:schemeClr>
+            </a:lnRef>
+            <a:fillRef idx="1">
+              <a:schemeClr val="accent1"/>
+            </a:fillRef>
+            <a:effectRef idx="0">
+              <a:schemeClr val="accent1"/>
+            </a:effectRef>
+            <a:fontRef idx="minor">
+              <a:schemeClr val="lt1"/>
+            </a:fontRef>
+          </p:style>
+          <p:txBody>
+            <a:bodyPr rtlCol="0" anchor="ctr"/>
+            <a:lstStyle/>
+            <a:p>
+              <a:pPr algn="ctr"/>
+              <a:r>
+                <a:rPr lang="en-US" altLang="zh-CN" dirty="0" smtClean="0"/>
+                <a:t>RM 0</a:t>
+              </a:r>
+              <a:endParaRPr lang="zh-CN" altLang="en-US" dirty="0"/>
+            </a:p>
+          </p:txBody>
+        </p:sp>
+      </p:grpSp>
+      <p:sp>
+        <p:nvSpPr>
+          <p:cNvPr id="30" name="圆角矩形 29"/>
           <p:cNvSpPr/>
           <p:nvPr/>
         </p:nvSpPr>
         <p:spPr>
           <a:xfrm>
-            <a:off x="776009" y="0"/>
-            <a:ext cx="10515600" cy="6857999"/>
-          </a:xfrm>
-          <a:prstGeom prst="roundRect">
-            <a:avLst/>
-          </a:prstGeom>
-        </p:spPr>
-        <p:style>
-          <a:lnRef idx="2">
-            <a:schemeClr val="accent1">
-              <a:shade val="50000"/>
-            </a:schemeClr>
-          </a:lnRef>
-          <a:fillRef idx="1">
-            <a:schemeClr val="accent1"/>
-          </a:fillRef>
-          <a:effectRef idx="0">
-            <a:schemeClr val="accent1"/>
-          </a:effectRef>
-          <a:fontRef idx="minor">
-            <a:schemeClr val="lt1"/>
-          </a:fontRef>
-        </p:style>
-        <p:txBody>
-          <a:bodyPr rtlCol="0" anchor="t" anchorCtr="0"/>
-          <a:lstStyle/>
-          <a:p>
-            <a:pPr algn="ctr"/>
-            <a:r>
-              <a:rPr lang="en-US" altLang="zh-CN" dirty="0" err="1" smtClean="0"/>
-              <a:t>Hadoop</a:t>
-            </a:r>
-            <a:r>
-              <a:rPr lang="en-US" altLang="zh-CN" dirty="0" smtClean="0"/>
-              <a:t> cluster</a:t>
-            </a:r>
-            <a:endParaRPr lang="zh-CN" altLang="en-US" dirty="0"/>
-          </a:p>
-        </p:txBody>
-      </p:sp>
-      <p:sp>
-        <p:nvSpPr>
-          <p:cNvPr id="5" name="圆角矩形 4"/>
-          <p:cNvSpPr/>
-          <p:nvPr/>
-        </p:nvSpPr>
-        <p:spPr>
-          <a:xfrm>
-            <a:off x="1120403" y="5223510"/>
-            <a:ext cx="1289655" cy="1154430"/>
+            <a:off x="2935782" y="508000"/>
+            <a:ext cx="6187809" cy="711200"/>
           </a:xfrm>
           <a:prstGeom prst="roundRect">
             <a:avLst/>
           </a:prstGeom>
           <a:solidFill>
-            <a:srgbClr val="92D050"/>
+            <a:srgbClr val="F1EE7E"/>
           </a:solidFill>
         </p:spPr>
         <p:style>
@@ -3499,279 +4578,35 @@
           <a:p>
             <a:pPr algn="ctr"/>
             <a:r>
-              <a:rPr lang="en-US" altLang="zh-CN" dirty="0" smtClean="0"/>
-              <a:t>DN/NM 0</a:t>
-            </a:r>
-            <a:endParaRPr lang="zh-CN" altLang="en-US" dirty="0" smtClean="0"/>
-          </a:p>
-        </p:txBody>
-      </p:sp>
-      <p:sp>
-        <p:nvSpPr>
-          <p:cNvPr id="6" name="圆角矩形 5"/>
-          <p:cNvSpPr/>
-          <p:nvPr/>
-        </p:nvSpPr>
-        <p:spPr>
-          <a:xfrm>
-            <a:off x="2526704" y="5223510"/>
-            <a:ext cx="1322070" cy="1154430"/>
-          </a:xfrm>
-          <a:prstGeom prst="roundRect">
-            <a:avLst/>
-          </a:prstGeom>
-          <a:solidFill>
-            <a:srgbClr val="92D050"/>
-          </a:solidFill>
-        </p:spPr>
-        <p:style>
-          <a:lnRef idx="2">
-            <a:schemeClr val="accent1">
-              <a:shade val="50000"/>
-            </a:schemeClr>
-          </a:lnRef>
-          <a:fillRef idx="1">
-            <a:schemeClr val="accent1"/>
-          </a:fillRef>
-          <a:effectRef idx="0">
-            <a:schemeClr val="accent1"/>
-          </a:effectRef>
-          <a:fontRef idx="minor">
-            <a:schemeClr val="lt1"/>
-          </a:fontRef>
-        </p:style>
-        <p:txBody>
-          <a:bodyPr rtlCol="0" anchor="ctr"/>
-          <a:lstStyle/>
-          <a:p>
-            <a:pPr algn="ctr"/>
-            <a:r>
-              <a:rPr lang="en-US" altLang="zh-CN" dirty="0" smtClean="0"/>
-              <a:t>DN/NM 1</a:t>
-            </a:r>
-            <a:endParaRPr lang="zh-CN" altLang="en-US" dirty="0" smtClean="0"/>
-          </a:p>
-        </p:txBody>
-      </p:sp>
-      <p:sp>
-        <p:nvSpPr>
-          <p:cNvPr id="7" name="圆角矩形 6"/>
-          <p:cNvSpPr/>
-          <p:nvPr/>
-        </p:nvSpPr>
-        <p:spPr>
-          <a:xfrm>
-            <a:off x="4068553" y="5223510"/>
-            <a:ext cx="1344930" cy="1154430"/>
-          </a:xfrm>
-          <a:prstGeom prst="roundRect">
-            <a:avLst/>
-          </a:prstGeom>
-          <a:solidFill>
-            <a:srgbClr val="92D050"/>
-          </a:solidFill>
-        </p:spPr>
-        <p:style>
-          <a:lnRef idx="2">
-            <a:schemeClr val="accent1">
-              <a:shade val="50000"/>
-            </a:schemeClr>
-          </a:lnRef>
-          <a:fillRef idx="1">
-            <a:schemeClr val="accent1"/>
-          </a:fillRef>
-          <a:effectRef idx="0">
-            <a:schemeClr val="accent1"/>
-          </a:effectRef>
-          <a:fontRef idx="minor">
-            <a:schemeClr val="lt1"/>
-          </a:fontRef>
-        </p:style>
-        <p:txBody>
-          <a:bodyPr rtlCol="0" anchor="ctr"/>
-          <a:lstStyle/>
-          <a:p>
-            <a:pPr algn="ctr"/>
-            <a:r>
-              <a:rPr lang="en-US" altLang="zh-CN" dirty="0" smtClean="0"/>
-              <a:t>DN/NM 2</a:t>
-            </a:r>
-            <a:endParaRPr lang="zh-CN" altLang="en-US" dirty="0" smtClean="0"/>
-          </a:p>
-        </p:txBody>
-      </p:sp>
-      <p:sp>
-        <p:nvSpPr>
-          <p:cNvPr id="8" name="圆角矩形 7"/>
-          <p:cNvSpPr/>
-          <p:nvPr/>
-        </p:nvSpPr>
-        <p:spPr>
-          <a:xfrm>
-            <a:off x="6174956" y="5223510"/>
-            <a:ext cx="1433410" cy="1154430"/>
-          </a:xfrm>
-          <a:prstGeom prst="roundRect">
-            <a:avLst/>
-          </a:prstGeom>
-          <a:solidFill>
-            <a:srgbClr val="00B050"/>
-          </a:solidFill>
-        </p:spPr>
-        <p:style>
-          <a:lnRef idx="2">
-            <a:schemeClr val="accent1">
-              <a:shade val="50000"/>
-            </a:schemeClr>
-          </a:lnRef>
-          <a:fillRef idx="1">
-            <a:schemeClr val="accent1"/>
-          </a:fillRef>
-          <a:effectRef idx="0">
-            <a:schemeClr val="accent1"/>
-          </a:effectRef>
-          <a:fontRef idx="minor">
-            <a:schemeClr val="lt1"/>
-          </a:fontRef>
-        </p:style>
-        <p:txBody>
-          <a:bodyPr rtlCol="0" anchor="ctr"/>
-          <a:lstStyle/>
-          <a:p>
-            <a:pPr algn="ctr"/>
-            <a:r>
-              <a:rPr lang="en-US" altLang="zh-CN" dirty="0" smtClean="0"/>
-              <a:t>DN/NM 3</a:t>
-            </a:r>
-            <a:endParaRPr lang="zh-CN" altLang="en-US" dirty="0"/>
-          </a:p>
-        </p:txBody>
-      </p:sp>
-      <p:sp>
-        <p:nvSpPr>
-          <p:cNvPr id="9" name="圆角矩形 8"/>
-          <p:cNvSpPr/>
-          <p:nvPr/>
-        </p:nvSpPr>
-        <p:spPr>
-          <a:xfrm>
-            <a:off x="7828145" y="5223510"/>
-            <a:ext cx="1432764" cy="1154430"/>
-          </a:xfrm>
-          <a:prstGeom prst="roundRect">
-            <a:avLst/>
-          </a:prstGeom>
-          <a:solidFill>
-            <a:srgbClr val="00B050"/>
-          </a:solidFill>
-        </p:spPr>
-        <p:style>
-          <a:lnRef idx="2">
-            <a:schemeClr val="accent1">
-              <a:shade val="50000"/>
-            </a:schemeClr>
-          </a:lnRef>
-          <a:fillRef idx="1">
-            <a:schemeClr val="accent1"/>
-          </a:fillRef>
-          <a:effectRef idx="0">
-            <a:schemeClr val="accent1"/>
-          </a:effectRef>
-          <a:fontRef idx="minor">
-            <a:schemeClr val="lt1"/>
-          </a:fontRef>
-        </p:style>
-        <p:txBody>
-          <a:bodyPr rtlCol="0" anchor="ctr"/>
-          <a:lstStyle/>
-          <a:p>
-            <a:pPr algn="ctr"/>
-            <a:r>
-              <a:rPr lang="en-US" altLang="zh-CN" dirty="0" smtClean="0"/>
-              <a:t>DN/NM</a:t>
-            </a:r>
-            <a:r>
-              <a:rPr lang="zh-CN" altLang="en-US" dirty="0" smtClean="0"/>
-              <a:t> </a:t>
-            </a:r>
-            <a:r>
-              <a:rPr lang="en-US" altLang="zh-CN" dirty="0" smtClean="0"/>
-              <a:t>4</a:t>
-            </a:r>
-            <a:endParaRPr lang="zh-CN" altLang="en-US" dirty="0" smtClean="0"/>
-          </a:p>
-        </p:txBody>
-      </p:sp>
-      <p:sp>
-        <p:nvSpPr>
-          <p:cNvPr id="10" name="圆角矩形 9"/>
-          <p:cNvSpPr/>
-          <p:nvPr/>
-        </p:nvSpPr>
-        <p:spPr>
-          <a:xfrm>
-            <a:off x="9480688" y="5223510"/>
-            <a:ext cx="1408626" cy="1154430"/>
-          </a:xfrm>
-          <a:prstGeom prst="roundRect">
-            <a:avLst/>
-          </a:prstGeom>
-          <a:solidFill>
-            <a:srgbClr val="00B050"/>
-          </a:solidFill>
-        </p:spPr>
-        <p:style>
-          <a:lnRef idx="2">
-            <a:schemeClr val="accent1">
-              <a:shade val="50000"/>
-            </a:schemeClr>
-          </a:lnRef>
-          <a:fillRef idx="1">
-            <a:schemeClr val="accent1"/>
-          </a:fillRef>
-          <a:effectRef idx="0">
-            <a:schemeClr val="accent1"/>
-          </a:effectRef>
-          <a:fontRef idx="minor">
-            <a:schemeClr val="lt1"/>
-          </a:fontRef>
-        </p:style>
-        <p:txBody>
-          <a:bodyPr rtlCol="0" anchor="ctr"/>
-          <a:lstStyle/>
-          <a:p>
-            <a:pPr algn="ctr"/>
-            <a:r>
-              <a:rPr lang="en-US" altLang="zh-CN" dirty="0" smtClean="0"/>
-              <a:t>DN/NM</a:t>
-            </a:r>
-            <a:r>
-              <a:rPr lang="zh-CN" altLang="en-US" dirty="0" smtClean="0"/>
-              <a:t> </a:t>
-            </a:r>
-            <a:r>
-              <a:rPr lang="en-US" altLang="zh-CN" smtClean="0"/>
-              <a:t>5</a:t>
-            </a:r>
-            <a:endParaRPr lang="zh-CN" altLang="en-US" dirty="0" smtClean="0"/>
+              <a:rPr lang="en-US" altLang="zh-CN" sz="2400" dirty="0" smtClean="0">
+                <a:solidFill>
+                  <a:schemeClr val="tx1"/>
+                </a:solidFill>
+              </a:rPr>
+              <a:t>zk0  zk1 zk2</a:t>
+            </a:r>
+            <a:endParaRPr lang="zh-CN" altLang="en-US" sz="2400" dirty="0">
+              <a:solidFill>
+                <a:schemeClr val="tx1"/>
+              </a:solidFill>
+            </a:endParaRPr>
           </a:p>
         </p:txBody>
       </p:sp>
       <p:cxnSp>
         <p:nvCxnSpPr>
-          <p:cNvPr id="16" name="直接连接符 15"/>
+          <p:cNvPr id="33" name="直接连接符 32"/>
           <p:cNvCxnSpPr/>
           <p:nvPr/>
         </p:nvCxnSpPr>
         <p:spPr>
-          <a:xfrm flipH="1">
-            <a:off x="1639501" y="4022874"/>
-            <a:ext cx="429329" cy="1109682"/>
+          <a:xfrm flipV="1">
+            <a:off x="2555046" y="1219200"/>
+            <a:ext cx="1891224" cy="1251527"/>
           </a:xfrm>
           <a:prstGeom prst="line">
             <a:avLst/>
           </a:prstGeom>
-          <a:ln/>
         </p:spPr>
         <p:style>
           <a:lnRef idx="3">
@@ -3790,19 +4625,18 @@
       </p:cxnSp>
       <p:cxnSp>
         <p:nvCxnSpPr>
-          <p:cNvPr id="18" name="直接连接符 17"/>
+          <p:cNvPr id="44" name="直接连接符 43"/>
           <p:cNvCxnSpPr/>
           <p:nvPr/>
         </p:nvCxnSpPr>
         <p:spPr>
-          <a:xfrm>
-            <a:off x="2478074" y="4022874"/>
-            <a:ext cx="625440" cy="1200636"/>
+          <a:xfrm flipH="1" flipV="1">
+            <a:off x="7406640" y="1293404"/>
+            <a:ext cx="1915362" cy="1087186"/>
           </a:xfrm>
           <a:prstGeom prst="line">
             <a:avLst/>
           </a:prstGeom>
-          <a:ln/>
         </p:spPr>
         <p:style>
           <a:lnRef idx="3">
@@ -3821,19 +4655,18 @@
       </p:cxnSp>
       <p:cxnSp>
         <p:nvCxnSpPr>
-          <p:cNvPr id="20" name="直接连接符 19"/>
+          <p:cNvPr id="45" name="直接连接符 44"/>
           <p:cNvCxnSpPr/>
           <p:nvPr/>
         </p:nvCxnSpPr>
         <p:spPr>
-          <a:xfrm>
-            <a:off x="3063240" y="4011930"/>
-            <a:ext cx="1677778" cy="1131570"/>
+          <a:xfrm flipV="1">
+            <a:off x="5899203" y="1282106"/>
+            <a:ext cx="18168" cy="1156888"/>
           </a:xfrm>
           <a:prstGeom prst="line">
             <a:avLst/>
           </a:prstGeom>
-          <a:ln/>
         </p:spPr>
         <p:style>
           <a:lnRef idx="3">
@@ -3850,679 +4683,6 @@
           </a:fontRef>
         </p:style>
       </p:cxnSp>
-      <p:cxnSp>
-        <p:nvCxnSpPr>
-          <p:cNvPr id="22" name="直接连接符 21"/>
-          <p:cNvCxnSpPr/>
-          <p:nvPr/>
-        </p:nvCxnSpPr>
-        <p:spPr>
-          <a:xfrm flipH="1">
-            <a:off x="7089439" y="3958306"/>
-            <a:ext cx="1455088" cy="1185194"/>
-          </a:xfrm>
-          <a:prstGeom prst="line">
-            <a:avLst/>
-          </a:prstGeom>
-          <a:ln/>
-        </p:spPr>
-        <p:style>
-          <a:lnRef idx="3">
-            <a:schemeClr val="dk1"/>
-          </a:lnRef>
-          <a:fillRef idx="0">
-            <a:schemeClr val="dk1"/>
-          </a:fillRef>
-          <a:effectRef idx="2">
-            <a:schemeClr val="dk1"/>
-          </a:effectRef>
-          <a:fontRef idx="minor">
-            <a:schemeClr val="tx1"/>
-          </a:fontRef>
-        </p:style>
-      </p:cxnSp>
-      <p:cxnSp>
-        <p:nvCxnSpPr>
-          <p:cNvPr id="23" name="直接连接符 22"/>
-          <p:cNvCxnSpPr/>
-          <p:nvPr/>
-        </p:nvCxnSpPr>
-        <p:spPr>
-          <a:xfrm flipH="1">
-            <a:off x="8544527" y="3958306"/>
-            <a:ext cx="434076" cy="1174250"/>
-          </a:xfrm>
-          <a:prstGeom prst="line">
-            <a:avLst/>
-          </a:prstGeom>
-          <a:ln/>
-        </p:spPr>
-        <p:style>
-          <a:lnRef idx="3">
-            <a:schemeClr val="dk1"/>
-          </a:lnRef>
-          <a:fillRef idx="0">
-            <a:schemeClr val="dk1"/>
-          </a:fillRef>
-          <a:effectRef idx="2">
-            <a:schemeClr val="dk1"/>
-          </a:effectRef>
-          <a:fontRef idx="minor">
-            <a:schemeClr val="tx1"/>
-          </a:fontRef>
-        </p:style>
-      </p:cxnSp>
-      <p:cxnSp>
-        <p:nvCxnSpPr>
-          <p:cNvPr id="24" name="直接连接符 23"/>
-          <p:cNvCxnSpPr/>
-          <p:nvPr/>
-        </p:nvCxnSpPr>
-        <p:spPr>
-          <a:xfrm>
-            <a:off x="9392022" y="3984692"/>
-            <a:ext cx="792979" cy="1147864"/>
-          </a:xfrm>
-          <a:prstGeom prst="line">
-            <a:avLst/>
-          </a:prstGeom>
-          <a:ln/>
-        </p:spPr>
-        <p:style>
-          <a:lnRef idx="3">
-            <a:schemeClr val="dk1"/>
-          </a:lnRef>
-          <a:fillRef idx="0">
-            <a:schemeClr val="dk1"/>
-          </a:fillRef>
-          <a:effectRef idx="2">
-            <a:schemeClr val="dk1"/>
-          </a:effectRef>
-          <a:fontRef idx="minor">
-            <a:schemeClr val="tx1"/>
-          </a:fontRef>
-        </p:style>
-      </p:cxnSp>
-      <p:sp>
-        <p:nvSpPr>
-          <p:cNvPr id="28" name="圆角矩形 27"/>
-          <p:cNvSpPr/>
-          <p:nvPr/>
-        </p:nvSpPr>
-        <p:spPr>
-          <a:xfrm>
-            <a:off x="4669149" y="1942130"/>
-            <a:ext cx="2185035" cy="845820"/>
-          </a:xfrm>
-          <a:prstGeom prst="roundRect">
-            <a:avLst/>
-          </a:prstGeom>
-          <a:solidFill>
-            <a:srgbClr val="FFC000"/>
-          </a:solidFill>
-        </p:spPr>
-        <p:style>
-          <a:lnRef idx="2">
-            <a:schemeClr val="accent1">
-              <a:shade val="50000"/>
-            </a:schemeClr>
-          </a:lnRef>
-          <a:fillRef idx="1">
-            <a:schemeClr val="accent1"/>
-          </a:fillRef>
-          <a:effectRef idx="0">
-            <a:schemeClr val="accent1"/>
-          </a:effectRef>
-          <a:fontRef idx="minor">
-            <a:schemeClr val="lt1"/>
-          </a:fontRef>
-        </p:style>
-        <p:txBody>
-          <a:bodyPr rtlCol="0" anchor="ctr"/>
-          <a:lstStyle/>
-          <a:p>
-            <a:pPr algn="ctr"/>
-            <a:r>
-              <a:rPr lang="en-US" altLang="zh-CN" dirty="0" smtClean="0"/>
-              <a:t>NN 0</a:t>
-            </a:r>
-            <a:endParaRPr lang="zh-CN" altLang="en-US" dirty="0"/>
-          </a:p>
-        </p:txBody>
-      </p:sp>
-      <p:sp>
-        <p:nvSpPr>
-          <p:cNvPr id="58" name="圆角矩形 57"/>
-          <p:cNvSpPr/>
-          <p:nvPr/>
-        </p:nvSpPr>
-        <p:spPr>
-          <a:xfrm>
-            <a:off x="1048268" y="1527486"/>
-            <a:ext cx="2346880" cy="2469123"/>
-          </a:xfrm>
-          <a:prstGeom prst="roundRect">
-            <a:avLst/>
-          </a:prstGeom>
-          <a:solidFill>
-            <a:schemeClr val="bg1">
-              <a:lumMod val="75000"/>
-            </a:schemeClr>
-          </a:solidFill>
-        </p:spPr>
-        <p:style>
-          <a:lnRef idx="2">
-            <a:schemeClr val="accent1">
-              <a:shade val="50000"/>
-            </a:schemeClr>
-          </a:lnRef>
-          <a:fillRef idx="1">
-            <a:schemeClr val="accent1"/>
-          </a:fillRef>
-          <a:effectRef idx="0">
-            <a:schemeClr val="accent1"/>
-          </a:effectRef>
-          <a:fontRef idx="minor">
-            <a:schemeClr val="lt1"/>
-          </a:fontRef>
-        </p:style>
-        <p:txBody>
-          <a:bodyPr rtlCol="0" anchor="t" anchorCtr="0"/>
-          <a:lstStyle/>
-          <a:p>
-            <a:pPr algn="ctr"/>
-            <a:r>
-              <a:rPr lang="en-US" altLang="zh-CN" dirty="0" err="1" smtClean="0"/>
-              <a:t>resourcemanager</a:t>
-            </a:r>
-            <a:r>
-              <a:rPr lang="en-US" altLang="zh-CN" dirty="0" smtClean="0"/>
-              <a:t> 0</a:t>
-            </a:r>
-            <a:endParaRPr lang="zh-CN" altLang="en-US" dirty="0"/>
-          </a:p>
-        </p:txBody>
-      </p:sp>
-      <p:sp>
-        <p:nvSpPr>
-          <p:cNvPr id="32" name="圆角矩形 31"/>
-          <p:cNvSpPr/>
-          <p:nvPr/>
-        </p:nvSpPr>
-        <p:spPr>
-          <a:xfrm>
-            <a:off x="4701613" y="1073572"/>
-            <a:ext cx="2185035" cy="845820"/>
-          </a:xfrm>
-          <a:prstGeom prst="roundRect">
-            <a:avLst/>
-          </a:prstGeom>
-          <a:solidFill>
-            <a:srgbClr val="FFC000"/>
-          </a:solidFill>
-        </p:spPr>
-        <p:style>
-          <a:lnRef idx="2">
-            <a:schemeClr val="accent1">
-              <a:shade val="50000"/>
-            </a:schemeClr>
-          </a:lnRef>
-          <a:fillRef idx="1">
-            <a:schemeClr val="accent1"/>
-          </a:fillRef>
-          <a:effectRef idx="0">
-            <a:schemeClr val="accent1"/>
-          </a:effectRef>
-          <a:fontRef idx="minor">
-            <a:schemeClr val="lt1"/>
-          </a:fontRef>
-        </p:style>
-        <p:txBody>
-          <a:bodyPr rtlCol="0" anchor="ctr"/>
-          <a:lstStyle/>
-          <a:p>
-            <a:pPr algn="ctr"/>
-            <a:r>
-              <a:rPr lang="en-US" altLang="zh-CN" dirty="0" smtClean="0"/>
-              <a:t>NN 1</a:t>
-            </a:r>
-            <a:endParaRPr lang="zh-CN" altLang="en-US" dirty="0"/>
-          </a:p>
-        </p:txBody>
-      </p:sp>
-      <p:cxnSp>
-        <p:nvCxnSpPr>
-          <p:cNvPr id="38" name="直接连接符 37"/>
-          <p:cNvCxnSpPr/>
-          <p:nvPr/>
-        </p:nvCxnSpPr>
-        <p:spPr>
-          <a:xfrm flipV="1">
-            <a:off x="2068830" y="2679910"/>
-            <a:ext cx="2486916" cy="2460669"/>
-          </a:xfrm>
-          <a:prstGeom prst="line">
-            <a:avLst/>
-          </a:prstGeom>
-        </p:spPr>
-        <p:style>
-          <a:lnRef idx="3">
-            <a:schemeClr val="accent4"/>
-          </a:lnRef>
-          <a:fillRef idx="0">
-            <a:schemeClr val="accent4"/>
-          </a:fillRef>
-          <a:effectRef idx="2">
-            <a:schemeClr val="accent4"/>
-          </a:effectRef>
-          <a:fontRef idx="minor">
-            <a:schemeClr val="tx1"/>
-          </a:fontRef>
-        </p:style>
-      </p:cxnSp>
-      <p:cxnSp>
-        <p:nvCxnSpPr>
-          <p:cNvPr id="39" name="直接连接符 38"/>
-          <p:cNvCxnSpPr/>
-          <p:nvPr/>
-        </p:nvCxnSpPr>
-        <p:spPr>
-          <a:xfrm flipV="1">
-            <a:off x="3250388" y="2867960"/>
-            <a:ext cx="1458562" cy="2344608"/>
-          </a:xfrm>
-          <a:prstGeom prst="line">
-            <a:avLst/>
-          </a:prstGeom>
-        </p:spPr>
-        <p:style>
-          <a:lnRef idx="3">
-            <a:schemeClr val="accent4"/>
-          </a:lnRef>
-          <a:fillRef idx="0">
-            <a:schemeClr val="accent4"/>
-          </a:fillRef>
-          <a:effectRef idx="2">
-            <a:schemeClr val="accent4"/>
-          </a:effectRef>
-          <a:fontRef idx="minor">
-            <a:schemeClr val="tx1"/>
-          </a:fontRef>
-        </p:style>
-      </p:cxnSp>
-      <p:cxnSp>
-        <p:nvCxnSpPr>
-          <p:cNvPr id="41" name="直接连接符 40"/>
-          <p:cNvCxnSpPr/>
-          <p:nvPr/>
-        </p:nvCxnSpPr>
-        <p:spPr>
-          <a:xfrm flipV="1">
-            <a:off x="4796463" y="2867960"/>
-            <a:ext cx="40616" cy="2264598"/>
-          </a:xfrm>
-          <a:prstGeom prst="line">
-            <a:avLst/>
-          </a:prstGeom>
-        </p:spPr>
-        <p:style>
-          <a:lnRef idx="3">
-            <a:schemeClr val="accent4"/>
-          </a:lnRef>
-          <a:fillRef idx="0">
-            <a:schemeClr val="accent4"/>
-          </a:fillRef>
-          <a:effectRef idx="2">
-            <a:schemeClr val="accent4"/>
-          </a:effectRef>
-          <a:fontRef idx="minor">
-            <a:schemeClr val="tx1"/>
-          </a:fontRef>
-        </p:style>
-      </p:cxnSp>
-      <p:cxnSp>
-        <p:nvCxnSpPr>
-          <p:cNvPr id="43" name="直接连接符 42"/>
-          <p:cNvCxnSpPr/>
-          <p:nvPr/>
-        </p:nvCxnSpPr>
-        <p:spPr>
-          <a:xfrm flipH="1" flipV="1">
-            <a:off x="6475016" y="2897631"/>
-            <a:ext cx="526910" cy="2234927"/>
-          </a:xfrm>
-          <a:prstGeom prst="line">
-            <a:avLst/>
-          </a:prstGeom>
-        </p:spPr>
-        <p:style>
-          <a:lnRef idx="3">
-            <a:schemeClr val="accent4"/>
-          </a:lnRef>
-          <a:fillRef idx="0">
-            <a:schemeClr val="accent4"/>
-          </a:fillRef>
-          <a:effectRef idx="2">
-            <a:schemeClr val="accent4"/>
-          </a:effectRef>
-          <a:fontRef idx="minor">
-            <a:schemeClr val="tx1"/>
-          </a:fontRef>
-        </p:style>
-      </p:cxnSp>
-      <p:cxnSp>
-        <p:nvCxnSpPr>
-          <p:cNvPr id="46" name="直接连接符 45"/>
-          <p:cNvCxnSpPr/>
-          <p:nvPr/>
-        </p:nvCxnSpPr>
-        <p:spPr>
-          <a:xfrm flipH="1" flipV="1">
-            <a:off x="6562527" y="2833426"/>
-            <a:ext cx="1894489" cy="2299131"/>
-          </a:xfrm>
-          <a:prstGeom prst="line">
-            <a:avLst/>
-          </a:prstGeom>
-        </p:spPr>
-        <p:style>
-          <a:lnRef idx="3">
-            <a:schemeClr val="accent4"/>
-          </a:lnRef>
-          <a:fillRef idx="0">
-            <a:schemeClr val="accent4"/>
-          </a:fillRef>
-          <a:effectRef idx="2">
-            <a:schemeClr val="accent4"/>
-          </a:effectRef>
-          <a:fontRef idx="minor">
-            <a:schemeClr val="tx1"/>
-          </a:fontRef>
-        </p:style>
-      </p:cxnSp>
-      <p:cxnSp>
-        <p:nvCxnSpPr>
-          <p:cNvPr id="49" name="直接连接符 48"/>
-          <p:cNvCxnSpPr/>
-          <p:nvPr/>
-        </p:nvCxnSpPr>
-        <p:spPr>
-          <a:xfrm flipH="1" flipV="1">
-            <a:off x="6617970" y="2723745"/>
-            <a:ext cx="3561927" cy="2468880"/>
-          </a:xfrm>
-          <a:prstGeom prst="line">
-            <a:avLst/>
-          </a:prstGeom>
-        </p:spPr>
-        <p:style>
-          <a:lnRef idx="3">
-            <a:schemeClr val="accent4"/>
-          </a:lnRef>
-          <a:fillRef idx="0">
-            <a:schemeClr val="accent4"/>
-          </a:fillRef>
-          <a:effectRef idx="2">
-            <a:schemeClr val="accent4"/>
-          </a:effectRef>
-          <a:fontRef idx="minor">
-            <a:schemeClr val="tx1"/>
-          </a:fontRef>
-        </p:style>
-      </p:cxnSp>
-      <p:sp>
-        <p:nvSpPr>
-          <p:cNvPr id="12" name="圆角矩形 11"/>
-          <p:cNvSpPr/>
-          <p:nvPr/>
-        </p:nvSpPr>
-        <p:spPr>
-          <a:xfrm>
-            <a:off x="1377835" y="2337436"/>
-            <a:ext cx="1680210" cy="742950"/>
-          </a:xfrm>
-          <a:prstGeom prst="roundRect">
-            <a:avLst/>
-          </a:prstGeom>
-          <a:solidFill>
-            <a:schemeClr val="accent2">
-              <a:lumMod val="60000"/>
-              <a:lumOff val="40000"/>
-            </a:schemeClr>
-          </a:solidFill>
-        </p:spPr>
-        <p:style>
-          <a:lnRef idx="2">
-            <a:schemeClr val="accent1">
-              <a:shade val="50000"/>
-            </a:schemeClr>
-          </a:lnRef>
-          <a:fillRef idx="1">
-            <a:schemeClr val="accent1"/>
-          </a:fillRef>
-          <a:effectRef idx="0">
-            <a:schemeClr val="accent1"/>
-          </a:effectRef>
-          <a:fontRef idx="minor">
-            <a:schemeClr val="lt1"/>
-          </a:fontRef>
-        </p:style>
-        <p:txBody>
-          <a:bodyPr rtlCol="0" anchor="ctr"/>
-          <a:lstStyle/>
-          <a:p>
-            <a:pPr algn="ctr"/>
-            <a:r>
-              <a:rPr lang="en-US" altLang="zh-CN" dirty="0" smtClean="0"/>
-              <a:t>RM 1</a:t>
-            </a:r>
-            <a:endParaRPr lang="zh-CN" altLang="en-US" dirty="0" smtClean="0"/>
-          </a:p>
-        </p:txBody>
-      </p:sp>
-      <p:sp>
-        <p:nvSpPr>
-          <p:cNvPr id="11" name="圆角矩形 10"/>
-          <p:cNvSpPr/>
-          <p:nvPr/>
-        </p:nvSpPr>
-        <p:spPr>
-          <a:xfrm>
-            <a:off x="1377835" y="3122214"/>
-            <a:ext cx="1680210" cy="742950"/>
-          </a:xfrm>
-          <a:prstGeom prst="roundRect">
-            <a:avLst/>
-          </a:prstGeom>
-          <a:solidFill>
-            <a:schemeClr val="accent2">
-              <a:lumMod val="60000"/>
-              <a:lumOff val="40000"/>
-            </a:schemeClr>
-          </a:solidFill>
-        </p:spPr>
-        <p:style>
-          <a:lnRef idx="2">
-            <a:schemeClr val="accent1">
-              <a:shade val="50000"/>
-            </a:schemeClr>
-          </a:lnRef>
-          <a:fillRef idx="1">
-            <a:schemeClr val="accent1"/>
-          </a:fillRef>
-          <a:effectRef idx="0">
-            <a:schemeClr val="accent1"/>
-          </a:effectRef>
-          <a:fontRef idx="minor">
-            <a:schemeClr val="lt1"/>
-          </a:fontRef>
-        </p:style>
-        <p:txBody>
-          <a:bodyPr rtlCol="0" anchor="ctr"/>
-          <a:lstStyle/>
-          <a:p>
-            <a:pPr algn="ctr"/>
-            <a:r>
-              <a:rPr lang="en-US" altLang="zh-CN" dirty="0" smtClean="0"/>
-              <a:t>RM 0</a:t>
-            </a:r>
-            <a:endParaRPr lang="zh-CN" altLang="en-US" dirty="0"/>
-          </a:p>
-        </p:txBody>
-      </p:sp>
-      <p:sp>
-        <p:nvSpPr>
-          <p:cNvPr id="59" name="圆角矩形 58"/>
-          <p:cNvSpPr/>
-          <p:nvPr/>
-        </p:nvSpPr>
-        <p:spPr>
-          <a:xfrm>
-            <a:off x="8193114" y="1473740"/>
-            <a:ext cx="2346880" cy="2469123"/>
-          </a:xfrm>
-          <a:prstGeom prst="roundRect">
-            <a:avLst/>
-          </a:prstGeom>
-          <a:solidFill>
-            <a:schemeClr val="bg1">
-              <a:lumMod val="75000"/>
-            </a:schemeClr>
-          </a:solidFill>
-        </p:spPr>
-        <p:style>
-          <a:lnRef idx="2">
-            <a:schemeClr val="accent1">
-              <a:shade val="50000"/>
-            </a:schemeClr>
-          </a:lnRef>
-          <a:fillRef idx="1">
-            <a:schemeClr val="accent1"/>
-          </a:fillRef>
-          <a:effectRef idx="0">
-            <a:schemeClr val="accent1"/>
-          </a:effectRef>
-          <a:fontRef idx="minor">
-            <a:schemeClr val="lt1"/>
-          </a:fontRef>
-        </p:style>
-        <p:txBody>
-          <a:bodyPr rtlCol="0" anchor="t" anchorCtr="0"/>
-          <a:lstStyle/>
-          <a:p>
-            <a:pPr algn="ctr"/>
-            <a:r>
-              <a:rPr lang="en-US" altLang="zh-CN" dirty="0" err="1" smtClean="0"/>
-              <a:t>resourcemanager</a:t>
-            </a:r>
-            <a:r>
-              <a:rPr lang="en-US" altLang="zh-CN" dirty="0" smtClean="0"/>
-              <a:t> 1</a:t>
-            </a:r>
-            <a:endParaRPr lang="zh-CN" altLang="en-US" dirty="0"/>
-          </a:p>
-        </p:txBody>
-      </p:sp>
-      <p:sp>
-        <p:nvSpPr>
-          <p:cNvPr id="14" name="圆角矩形 13"/>
-          <p:cNvSpPr/>
-          <p:nvPr/>
-        </p:nvSpPr>
-        <p:spPr>
-          <a:xfrm>
-            <a:off x="8508370" y="2352270"/>
-            <a:ext cx="1680210" cy="742950"/>
-          </a:xfrm>
-          <a:prstGeom prst="roundRect">
-            <a:avLst/>
-          </a:prstGeom>
-          <a:solidFill>
-            <a:schemeClr val="accent2">
-              <a:lumMod val="60000"/>
-              <a:lumOff val="40000"/>
-            </a:schemeClr>
-          </a:solidFill>
-        </p:spPr>
-        <p:style>
-          <a:lnRef idx="2">
-            <a:schemeClr val="accent1">
-              <a:shade val="50000"/>
-            </a:schemeClr>
-          </a:lnRef>
-          <a:fillRef idx="1">
-            <a:schemeClr val="accent1"/>
-          </a:fillRef>
-          <a:effectRef idx="0">
-            <a:schemeClr val="accent1"/>
-          </a:effectRef>
-          <a:fontRef idx="minor">
-            <a:schemeClr val="lt1"/>
-          </a:fontRef>
-        </p:style>
-        <p:txBody>
-          <a:bodyPr rtlCol="0" anchor="ctr"/>
-          <a:lstStyle/>
-          <a:p>
-            <a:pPr algn="ctr"/>
-            <a:r>
-              <a:rPr lang="en-US" altLang="zh-CN" dirty="0" smtClean="0"/>
-              <a:t>RM 1</a:t>
-            </a:r>
-            <a:endParaRPr lang="zh-CN" altLang="en-US" dirty="0" smtClean="0"/>
-          </a:p>
-        </p:txBody>
-      </p:sp>
-      <p:sp>
-        <p:nvSpPr>
-          <p:cNvPr id="13" name="圆角矩形 12"/>
-          <p:cNvSpPr/>
-          <p:nvPr/>
-        </p:nvSpPr>
-        <p:spPr>
-          <a:xfrm>
-            <a:off x="8483803" y="3146716"/>
-            <a:ext cx="1680210" cy="742950"/>
-          </a:xfrm>
-          <a:prstGeom prst="roundRect">
-            <a:avLst/>
-          </a:prstGeom>
-          <a:solidFill>
-            <a:schemeClr val="accent2">
-              <a:lumMod val="60000"/>
-              <a:lumOff val="40000"/>
-            </a:schemeClr>
-          </a:solidFill>
-        </p:spPr>
-        <p:style>
-          <a:lnRef idx="2">
-            <a:schemeClr val="accent1">
-              <a:shade val="50000"/>
-            </a:schemeClr>
-          </a:lnRef>
-          <a:fillRef idx="1">
-            <a:schemeClr val="accent1"/>
-          </a:fillRef>
-          <a:effectRef idx="0">
-            <a:schemeClr val="accent1"/>
-          </a:effectRef>
-          <a:fontRef idx="minor">
-            <a:schemeClr val="lt1"/>
-          </a:fontRef>
-        </p:style>
-        <p:txBody>
-          <a:bodyPr rtlCol="0" anchor="ctr"/>
-          <a:lstStyle/>
-          <a:p>
-            <a:pPr algn="ctr"/>
-            <a:r>
-              <a:rPr lang="en-US" altLang="zh-CN" dirty="0" smtClean="0"/>
-              <a:t>RM 0</a:t>
-            </a:r>
-            <a:endParaRPr lang="zh-CN" altLang="en-US" dirty="0"/>
-          </a:p>
-        </p:txBody>
-      </p:sp>
     </p:spTree>
     <p:extLst>
       <p:ext uri="{BB962C8B-B14F-4D97-AF65-F5344CB8AC3E}">

</xml_diff>